<commit_message>
Updated "Latency Numbers Every Programmer Should Know"
</commit_message>
<xml_diff>
--- a/lectures/14 - Virtual Memory.pptx
+++ b/lectures/14 - Virtual Memory.pptx
@@ -9491,527 +9491,8 @@
           </a:lstStyle>
           <a:p>
             <a:r>
+              <a:rPr dirty="0"/>
               <a:t>Latency Numbers Every Programmer Should Know</a:t>
-            </a:r>
-          </a:p>
-        </p:txBody>
-      </p:sp>
-      <p:sp>
-        <p:nvSpPr>
-          <p:cNvPr id="141" name="Shape 141"/>
-          <p:cNvSpPr/>
-          <p:nvPr/>
-        </p:nvSpPr>
-        <p:spPr>
-          <a:xfrm>
-            <a:off x="408063" y="2039264"/>
-            <a:ext cx="12188675" cy="7427674"/>
-          </a:xfrm>
-          <a:prstGeom prst="rect">
-            <a:avLst/>
-          </a:prstGeom>
-          <a:ln w="12700">
-            <a:miter lim="400000"/>
-          </a:ln>
-          <a:extLst>
-            <a:ext uri="{C572A759-6A51-4108-AA02-DFA0A04FC94B}">
-              <ma14:wrappingTextBoxFlag xmlns="" xmlns:ma14="http://schemas.microsoft.com/office/mac/drawingml/2011/main" val="1"/>
-            </a:ext>
-          </a:extLst>
-        </p:spPr>
-        <p:txBody>
-          <a:bodyPr lIns="50800" tIns="50800" rIns="50800" bIns="50800" anchor="ctr">
-            <a:spAutoFit/>
-          </a:bodyPr>
-          <a:lstStyle/>
-          <a:p>
-            <a:pPr algn="l">
-              <a:defRPr sz="1700">
-                <a:latin typeface="Courier"/>
-                <a:ea typeface="Courier"/>
-                <a:cs typeface="Courier"/>
-                <a:sym typeface="Courier"/>
-              </a:defRPr>
-            </a:pPr>
-            <a:r>
-              <a:rPr dirty="0"/>
-              <a:t>Latency Comparison Numbers</a:t>
-            </a:r>
-            <a:r>
-              <a:rPr lang="en-US" dirty="0"/>
-              <a:t> (~</a:t>
-            </a:r>
-            <a:r>
-              <a:rPr lang="en-US" u="sng" dirty="0"/>
-              <a:t>2012</a:t>
-            </a:r>
-            <a:r>
-              <a:rPr lang="en-US" dirty="0"/>
-              <a:t>)</a:t>
-            </a:r>
-            <a:endParaRPr dirty="0"/>
-          </a:p>
-          <a:p>
-            <a:pPr algn="l">
-              <a:defRPr sz="1700">
-                <a:latin typeface="Courier"/>
-                <a:ea typeface="Courier"/>
-                <a:cs typeface="Courier"/>
-                <a:sym typeface="Courier"/>
-              </a:defRPr>
-            </a:pPr>
-            <a:r>
-              <a:rPr dirty="0"/>
-              <a:t>--------------------------</a:t>
-            </a:r>
-          </a:p>
-          <a:p>
-            <a:pPr algn="l">
-              <a:defRPr sz="1700">
-                <a:latin typeface="Courier"/>
-                <a:ea typeface="Courier"/>
-                <a:cs typeface="Courier"/>
-                <a:sym typeface="Courier"/>
-              </a:defRPr>
-            </a:pPr>
-            <a:r>
-              <a:rPr dirty="0"/>
-              <a:t>L1 cache reference                            0.5 ns</a:t>
-            </a:r>
-          </a:p>
-          <a:p>
-            <a:pPr algn="l">
-              <a:defRPr sz="1700">
-                <a:latin typeface="Courier"/>
-                <a:ea typeface="Courier"/>
-                <a:cs typeface="Courier"/>
-                <a:sym typeface="Courier"/>
-              </a:defRPr>
-            </a:pPr>
-            <a:r>
-              <a:rPr dirty="0"/>
-              <a:t>Branch </a:t>
-            </a:r>
-            <a:r>
-              <a:rPr dirty="0" err="1"/>
-              <a:t>mispredict</a:t>
-            </a:r>
-            <a:r>
-              <a:rPr dirty="0"/>
-              <a:t>                             5   ns</a:t>
-            </a:r>
-          </a:p>
-          <a:p>
-            <a:pPr algn="l">
-              <a:defRPr sz="1700">
-                <a:latin typeface="Courier"/>
-                <a:ea typeface="Courier"/>
-                <a:cs typeface="Courier"/>
-                <a:sym typeface="Courier"/>
-              </a:defRPr>
-            </a:pPr>
-            <a:r>
-              <a:rPr dirty="0"/>
-              <a:t>L2 cache reference                            7   ns             14x L1 cache</a:t>
-            </a:r>
-          </a:p>
-          <a:p>
-            <a:pPr algn="l">
-              <a:defRPr sz="1700">
-                <a:latin typeface="Courier"/>
-                <a:ea typeface="Courier"/>
-                <a:cs typeface="Courier"/>
-                <a:sym typeface="Courier"/>
-              </a:defRPr>
-            </a:pPr>
-            <a:r>
-              <a:rPr dirty="0"/>
-              <a:t>Mutex lock/unlock                            25   ns</a:t>
-            </a:r>
-          </a:p>
-          <a:p>
-            <a:pPr algn="l">
-              <a:defRPr sz="1700">
-                <a:latin typeface="Courier"/>
-                <a:ea typeface="Courier"/>
-                <a:cs typeface="Courier"/>
-                <a:sym typeface="Courier"/>
-              </a:defRPr>
-            </a:pPr>
-            <a:r>
-              <a:rPr dirty="0"/>
-              <a:t>Main memory reference                       100   ns             20x L2 cache, 200x L1 cache</a:t>
-            </a:r>
-          </a:p>
-          <a:p>
-            <a:pPr algn="l">
-              <a:defRPr sz="1700">
-                <a:latin typeface="Courier"/>
-                <a:ea typeface="Courier"/>
-                <a:cs typeface="Courier"/>
-                <a:sym typeface="Courier"/>
-              </a:defRPr>
-            </a:pPr>
-            <a:r>
-              <a:rPr dirty="0"/>
-              <a:t>Compress 1K bytes with Zippy              3,000   ns</a:t>
-            </a:r>
-          </a:p>
-          <a:p>
-            <a:pPr algn="l">
-              <a:defRPr sz="1700">
-                <a:latin typeface="Courier"/>
-                <a:ea typeface="Courier"/>
-                <a:cs typeface="Courier"/>
-                <a:sym typeface="Courier"/>
-              </a:defRPr>
-            </a:pPr>
-            <a:r>
-              <a:rPr dirty="0"/>
-              <a:t>Send 1K bytes over 1 Gbps network        10,000   ns    0.01 </a:t>
-            </a:r>
-            <a:r>
-              <a:rPr dirty="0" err="1"/>
-              <a:t>ms</a:t>
-            </a:r>
-            <a:endParaRPr dirty="0"/>
-          </a:p>
-          <a:p>
-            <a:pPr algn="l">
-              <a:defRPr sz="1700">
-                <a:latin typeface="Courier"/>
-                <a:ea typeface="Courier"/>
-                <a:cs typeface="Courier"/>
-                <a:sym typeface="Courier"/>
-              </a:defRPr>
-            </a:pPr>
-            <a:r>
-              <a:rPr dirty="0"/>
-              <a:t>Read 4K randomly from SSD*              150,000   ns    0.15 </a:t>
-            </a:r>
-            <a:r>
-              <a:rPr dirty="0" err="1"/>
-              <a:t>ms</a:t>
-            </a:r>
-            <a:endParaRPr dirty="0"/>
-          </a:p>
-          <a:p>
-            <a:pPr algn="l">
-              <a:defRPr sz="1700">
-                <a:latin typeface="Courier"/>
-                <a:ea typeface="Courier"/>
-                <a:cs typeface="Courier"/>
-                <a:sym typeface="Courier"/>
-              </a:defRPr>
-            </a:pPr>
-            <a:r>
-              <a:rPr dirty="0"/>
-              <a:t>Read 1 MB sequentially from memory      250,000   ns    0.25 </a:t>
-            </a:r>
-            <a:r>
-              <a:rPr dirty="0" err="1"/>
-              <a:t>ms</a:t>
-            </a:r>
-            <a:endParaRPr dirty="0"/>
-          </a:p>
-          <a:p>
-            <a:pPr algn="l">
-              <a:defRPr sz="1700">
-                <a:latin typeface="Courier"/>
-                <a:ea typeface="Courier"/>
-                <a:cs typeface="Courier"/>
-                <a:sym typeface="Courier"/>
-              </a:defRPr>
-            </a:pPr>
-            <a:r>
-              <a:rPr dirty="0"/>
-              <a:t>Round trip within same datacenter       500,000   ns    0.5  </a:t>
-            </a:r>
-            <a:r>
-              <a:rPr dirty="0" err="1"/>
-              <a:t>ms</a:t>
-            </a:r>
-            <a:endParaRPr dirty="0"/>
-          </a:p>
-          <a:p>
-            <a:pPr algn="l">
-              <a:defRPr sz="1700">
-                <a:latin typeface="Courier"/>
-                <a:ea typeface="Courier"/>
-                <a:cs typeface="Courier"/>
-                <a:sym typeface="Courier"/>
-              </a:defRPr>
-            </a:pPr>
-            <a:r>
-              <a:rPr dirty="0"/>
-              <a:t>Read 1 MB sequentially from SSD*      1,000,000   ns    1    </a:t>
-            </a:r>
-            <a:r>
-              <a:rPr dirty="0" err="1"/>
-              <a:t>ms</a:t>
-            </a:r>
-            <a:r>
-              <a:rPr dirty="0"/>
-              <a:t>  4X memory</a:t>
-            </a:r>
-          </a:p>
-          <a:p>
-            <a:pPr algn="l">
-              <a:defRPr sz="1700">
-                <a:latin typeface="Courier"/>
-                <a:ea typeface="Courier"/>
-                <a:cs typeface="Courier"/>
-                <a:sym typeface="Courier"/>
-              </a:defRPr>
-            </a:pPr>
-            <a:r>
-              <a:rPr dirty="0"/>
-              <a:t>Disk seek                            10,000,000   ns   10    </a:t>
-            </a:r>
-            <a:r>
-              <a:rPr dirty="0" err="1"/>
-              <a:t>ms</a:t>
-            </a:r>
-            <a:r>
-              <a:rPr dirty="0"/>
-              <a:t>  20x datacenter roundtrip</a:t>
-            </a:r>
-          </a:p>
-          <a:p>
-            <a:pPr algn="l">
-              <a:defRPr sz="1700">
-                <a:latin typeface="Courier"/>
-                <a:ea typeface="Courier"/>
-                <a:cs typeface="Courier"/>
-                <a:sym typeface="Courier"/>
-              </a:defRPr>
-            </a:pPr>
-            <a:r>
-              <a:rPr dirty="0"/>
-              <a:t>Read 1 MB sequentially from disk     20,000,000   ns   20    </a:t>
-            </a:r>
-            <a:r>
-              <a:rPr dirty="0" err="1"/>
-              <a:t>ms</a:t>
-            </a:r>
-            <a:r>
-              <a:rPr dirty="0"/>
-              <a:t>  80x memory, 20X SSD</a:t>
-            </a:r>
-          </a:p>
-          <a:p>
-            <a:pPr algn="l">
-              <a:defRPr sz="1700">
-                <a:latin typeface="Courier"/>
-                <a:ea typeface="Courier"/>
-                <a:cs typeface="Courier"/>
-                <a:sym typeface="Courier"/>
-              </a:defRPr>
-            </a:pPr>
-            <a:r>
-              <a:rPr dirty="0"/>
-              <a:t>Send packet CA-&gt;Netherlands-&gt;CA     150,000,000   ns  150    </a:t>
-            </a:r>
-            <a:r>
-              <a:rPr dirty="0" err="1"/>
-              <a:t>ms</a:t>
-            </a:r>
-            <a:endParaRPr dirty="0"/>
-          </a:p>
-          <a:p>
-            <a:pPr algn="l">
-              <a:defRPr sz="1700">
-                <a:latin typeface="Courier"/>
-                <a:ea typeface="Courier"/>
-                <a:cs typeface="Courier"/>
-                <a:sym typeface="Courier"/>
-              </a:defRPr>
-            </a:pPr>
-            <a:r>
-              <a:rPr dirty="0"/>
-              <a:t> </a:t>
-            </a:r>
-          </a:p>
-          <a:p>
-            <a:pPr algn="l">
-              <a:defRPr sz="1700">
-                <a:latin typeface="Courier"/>
-                <a:ea typeface="Courier"/>
-                <a:cs typeface="Courier"/>
-                <a:sym typeface="Courier"/>
-              </a:defRPr>
-            </a:pPr>
-            <a:r>
-              <a:rPr dirty="0"/>
-              <a:t>Notes</a:t>
-            </a:r>
-          </a:p>
-          <a:p>
-            <a:pPr algn="l">
-              <a:defRPr sz="1700">
-                <a:latin typeface="Courier"/>
-                <a:ea typeface="Courier"/>
-                <a:cs typeface="Courier"/>
-                <a:sym typeface="Courier"/>
-              </a:defRPr>
-            </a:pPr>
-            <a:r>
-              <a:rPr dirty="0"/>
-              <a:t>-----</a:t>
-            </a:r>
-          </a:p>
-          <a:p>
-            <a:pPr algn="l">
-              <a:defRPr sz="1700">
-                <a:latin typeface="Courier"/>
-                <a:ea typeface="Courier"/>
-                <a:cs typeface="Courier"/>
-                <a:sym typeface="Courier"/>
-              </a:defRPr>
-            </a:pPr>
-            <a:r>
-              <a:rPr dirty="0"/>
-              <a:t>1 ns = 10-9 seconds</a:t>
-            </a:r>
-          </a:p>
-          <a:p>
-            <a:pPr algn="l">
-              <a:defRPr sz="1700">
-                <a:latin typeface="Courier"/>
-                <a:ea typeface="Courier"/>
-                <a:cs typeface="Courier"/>
-                <a:sym typeface="Courier"/>
-              </a:defRPr>
-            </a:pPr>
-            <a:r>
-              <a:rPr dirty="0"/>
-              <a:t>1 </a:t>
-            </a:r>
-            <a:r>
-              <a:rPr dirty="0" err="1"/>
-              <a:t>ms</a:t>
-            </a:r>
-            <a:r>
-              <a:rPr dirty="0"/>
-              <a:t> = 10-3 seconds</a:t>
-            </a:r>
-          </a:p>
-          <a:p>
-            <a:pPr algn="l">
-              <a:defRPr sz="1700">
-                <a:latin typeface="Courier"/>
-                <a:ea typeface="Courier"/>
-                <a:cs typeface="Courier"/>
-                <a:sym typeface="Courier"/>
-              </a:defRPr>
-            </a:pPr>
-            <a:r>
-              <a:rPr dirty="0"/>
-              <a:t>* Assuming ~1GB/sec SSD</a:t>
-            </a:r>
-          </a:p>
-          <a:p>
-            <a:pPr algn="l">
-              <a:defRPr sz="1700">
-                <a:latin typeface="Courier"/>
-                <a:ea typeface="Courier"/>
-                <a:cs typeface="Courier"/>
-                <a:sym typeface="Courier"/>
-              </a:defRPr>
-            </a:pPr>
-            <a:r>
-              <a:rPr dirty="0"/>
-              <a:t> </a:t>
-            </a:r>
-          </a:p>
-          <a:p>
-            <a:pPr algn="l">
-              <a:defRPr sz="1700">
-                <a:latin typeface="Courier"/>
-                <a:ea typeface="Courier"/>
-                <a:cs typeface="Courier"/>
-                <a:sym typeface="Courier"/>
-              </a:defRPr>
-            </a:pPr>
-            <a:r>
-              <a:rPr dirty="0"/>
-              <a:t>Credit</a:t>
-            </a:r>
-          </a:p>
-          <a:p>
-            <a:pPr algn="l">
-              <a:defRPr sz="1700">
-                <a:latin typeface="Courier"/>
-                <a:ea typeface="Courier"/>
-                <a:cs typeface="Courier"/>
-                <a:sym typeface="Courier"/>
-              </a:defRPr>
-            </a:pPr>
-            <a:r>
-              <a:rPr dirty="0"/>
-              <a:t>------</a:t>
-            </a:r>
-          </a:p>
-          <a:p>
-            <a:pPr algn="l">
-              <a:defRPr sz="1700">
-                <a:latin typeface="Courier"/>
-                <a:ea typeface="Courier"/>
-                <a:cs typeface="Courier"/>
-                <a:sym typeface="Courier"/>
-              </a:defRPr>
-            </a:pPr>
-            <a:r>
-              <a:rPr dirty="0"/>
-              <a:t>By Jeff Dean:               http://research.google.com/people/jeff/</a:t>
-            </a:r>
-          </a:p>
-          <a:p>
-            <a:pPr algn="l">
-              <a:defRPr sz="1700">
-                <a:latin typeface="Courier"/>
-                <a:ea typeface="Courier"/>
-                <a:cs typeface="Courier"/>
-                <a:sym typeface="Courier"/>
-              </a:defRPr>
-            </a:pPr>
-            <a:r>
-              <a:rPr dirty="0"/>
-              <a:t>Originally by Peter </a:t>
-            </a:r>
-            <a:r>
-              <a:rPr dirty="0" err="1"/>
-              <a:t>Norvig</a:t>
-            </a:r>
-            <a:r>
-              <a:rPr dirty="0"/>
-              <a:t>: </a:t>
-            </a:r>
-            <a:r>
-              <a:rPr dirty="0">
-                <a:hlinkClick r:id="rId2"/>
-              </a:rPr>
-              <a:t>http://norvig.com/21-days.html#answers</a:t>
-            </a:r>
-          </a:p>
-          <a:p>
-            <a:pPr algn="l">
-              <a:defRPr sz="1700">
-                <a:latin typeface="Courier"/>
-                <a:ea typeface="Courier"/>
-                <a:cs typeface="Courier"/>
-                <a:sym typeface="Courier"/>
-              </a:defRPr>
-            </a:pPr>
-            <a:r>
-              <a:rPr dirty="0"/>
-              <a:t>Source: </a:t>
-            </a:r>
-            <a:r>
-              <a:rPr u="sng" dirty="0">
-                <a:hlinkClick r:id="rId3"/>
-              </a:rPr>
-              <a:t>https://gist.github.com/jboner/2841832</a:t>
             </a:r>
           </a:p>
         </p:txBody>
@@ -10036,6 +9517,103 @@
               <a:t>3</a:t>
             </a:fld>
             <a:endParaRPr lang="en-US"/>
+          </a:p>
+        </p:txBody>
+      </p:sp>
+      <p:pic>
+        <p:nvPicPr>
+          <p:cNvPr id="3" name="Picture 2">
+            <a:extLst>
+              <a:ext uri="{FF2B5EF4-FFF2-40B4-BE49-F238E27FC236}">
+                <a16:creationId xmlns:a16="http://schemas.microsoft.com/office/drawing/2014/main" id="{B47AFB11-B99F-4B54-8A67-05C40413FBBE}"/>
+              </a:ext>
+            </a:extLst>
+          </p:cNvPr>
+          <p:cNvPicPr>
+            <a:picLocks noChangeAspect="1"/>
+          </p:cNvPicPr>
+          <p:nvPr/>
+        </p:nvPicPr>
+        <p:blipFill>
+          <a:blip r:embed="rId2"/>
+          <a:stretch>
+            <a:fillRect/>
+          </a:stretch>
+        </p:blipFill>
+        <p:spPr>
+          <a:xfrm>
+            <a:off x="0" y="2515402"/>
+            <a:ext cx="13004800" cy="4722796"/>
+          </a:xfrm>
+          <a:prstGeom prst="rect">
+            <a:avLst/>
+          </a:prstGeom>
+        </p:spPr>
+      </p:pic>
+      <p:sp>
+        <p:nvSpPr>
+          <p:cNvPr id="4" name="TextBox 3">
+            <a:extLst>
+              <a:ext uri="{FF2B5EF4-FFF2-40B4-BE49-F238E27FC236}">
+                <a16:creationId xmlns:a16="http://schemas.microsoft.com/office/drawing/2014/main" id="{12686DB2-EBFA-4167-A59B-70C6D70D847A}"/>
+              </a:ext>
+            </a:extLst>
+          </p:cNvPr>
+          <p:cNvSpPr txBox="1"/>
+          <p:nvPr/>
+        </p:nvSpPr>
+        <p:spPr>
+          <a:xfrm>
+            <a:off x="1666522" y="8613800"/>
+            <a:ext cx="9513823" cy="471924"/>
+          </a:xfrm>
+          <a:prstGeom prst="rect">
+            <a:avLst/>
+          </a:prstGeom>
+          <a:noFill/>
+          <a:ln w="12700" cap="flat">
+            <a:noFill/>
+            <a:miter lim="400000"/>
+          </a:ln>
+          <a:effectLst/>
+          <a:sp3d/>
+        </p:spPr>
+        <p:style>
+          <a:lnRef idx="0">
+            <a:scrgbClr r="0" g="0" b="0"/>
+          </a:lnRef>
+          <a:fillRef idx="0">
+            <a:scrgbClr r="0" g="0" b="0"/>
+          </a:fillRef>
+          <a:effectRef idx="0">
+            <a:scrgbClr r="0" g="0" b="0"/>
+          </a:effectRef>
+          <a:fontRef idx="none"/>
+        </p:style>
+        <p:txBody>
+          <a:bodyPr rot="0" spcFirstLastPara="1" vertOverflow="overflow" horzOverflow="overflow" vert="horz" wrap="none" lIns="50800" tIns="50800" rIns="50800" bIns="50800" numCol="1" spcCol="38100" rtlCol="0" anchor="ctr">
+            <a:spAutoFit/>
+          </a:bodyPr>
+          <a:lstStyle/>
+          <a:p>
+            <a:r>
+              <a:rPr lang="en-US" sz="2400" dirty="0"/>
+              <a:t>https://people.eecs.berkeley.edu/~rcs/research/interactive_latency.html</a:t>
+            </a:r>
+            <a:endParaRPr kumimoji="0" lang="en-US" sz="2400" b="0" i="0" u="none" strike="noStrike" cap="none" spc="0" normalizeH="0" baseline="0" dirty="0">
+              <a:ln>
+                <a:noFill/>
+              </a:ln>
+              <a:solidFill>
+                <a:srgbClr val="000000"/>
+              </a:solidFill>
+              <a:effectLst/>
+              <a:uFillTx/>
+              <a:latin typeface="+mn-lt"/>
+              <a:ea typeface="+mn-ea"/>
+              <a:cs typeface="+mn-cs"/>
+              <a:sym typeface="Helvetica Light"/>
+            </a:endParaRPr>
           </a:p>
         </p:txBody>
       </p:sp>

</xml_diff>